<commit_message>
Add demo website and update pptx
</commit_message>
<xml_diff>
--- a/InstaCore_Presentation_DiTech_Squad.pptx
+++ b/InstaCore_Presentation_DiTech_Squad.pptx
@@ -5360,13 +5360,13 @@
   <p:clrMapOvr>
     <a:masterClrMapping/>
   </p:clrMapOvr>
-  <mc:AlternateContent xmlns:mc="http://schemas.openxmlformats.org/markup-compatibility/2006">
-    <mc:Choice xmlns:p14="http://schemas.microsoft.com/office/powerpoint/2010/main" Requires="p14">
+  <mc:AlternateContent xmlns:mc="http://schemas.openxmlformats.org/markup-compatibility/2006" xmlns:p14="http://schemas.microsoft.com/office/powerpoint/2010/main">
+    <mc:Choice Requires="p14">
       <p:transition spd="med" p14:dur="700">
         <p:fade/>
       </p:transition>
     </mc:Choice>
-    <mc:Fallback>
+    <mc:Fallback xmlns="">
       <p:transition spd="med">
         <p:fade/>
       </p:transition>
@@ -5456,8 +5456,8 @@
         </p:blipFill>
         <p:spPr>
           <a:xfrm>
-            <a:off x="775422" y="2318929"/>
-            <a:ext cx="7593155" cy="3811513"/>
+            <a:off x="775422" y="2450168"/>
+            <a:ext cx="7593155" cy="3549034"/>
           </a:xfrm>
           <a:prstGeom prst="roundRect">
             <a:avLst>
@@ -5500,13 +5500,13 @@
   <p:clrMapOvr>
     <a:masterClrMapping/>
   </p:clrMapOvr>
-  <mc:AlternateContent xmlns:mc="http://schemas.openxmlformats.org/markup-compatibility/2006">
-    <mc:Choice xmlns:p14="http://schemas.microsoft.com/office/powerpoint/2010/main" Requires="p14">
+  <mc:AlternateContent xmlns:mc="http://schemas.openxmlformats.org/markup-compatibility/2006" xmlns:p14="http://schemas.microsoft.com/office/powerpoint/2010/main">
+    <mc:Choice Requires="p14">
       <p:transition spd="med" p14:dur="700">
         <p:fade/>
       </p:transition>
     </mc:Choice>
-    <mc:Fallback>
+    <mc:Fallback xmlns="">
       <p:transition spd="med">
         <p:fade/>
       </p:transition>
@@ -5596,8 +5596,8 @@
         </p:blipFill>
         <p:spPr>
           <a:xfrm>
-            <a:off x="823118" y="2318929"/>
-            <a:ext cx="7497764" cy="3811513"/>
+            <a:off x="823118" y="2464222"/>
+            <a:ext cx="7497764" cy="3520927"/>
           </a:xfrm>
           <a:prstGeom prst="roundRect">
             <a:avLst>
@@ -5640,13 +5640,13 @@
   <p:clrMapOvr>
     <a:masterClrMapping/>
   </p:clrMapOvr>
-  <mc:AlternateContent xmlns:mc="http://schemas.openxmlformats.org/markup-compatibility/2006">
-    <mc:Choice xmlns:p14="http://schemas.microsoft.com/office/powerpoint/2010/main" Requires="p14">
+  <mc:AlternateContent xmlns:mc="http://schemas.openxmlformats.org/markup-compatibility/2006" xmlns:p14="http://schemas.microsoft.com/office/powerpoint/2010/main">
+    <mc:Choice Requires="p14">
       <p:transition spd="med" p14:dur="700">
         <p:fade/>
       </p:transition>
     </mc:Choice>
-    <mc:Fallback>
+    <mc:Fallback xmlns="">
       <p:transition spd="med">
         <p:fade/>
       </p:transition>
@@ -5743,8 +5743,8 @@
         </p:blipFill>
         <p:spPr>
           <a:xfrm>
-            <a:off x="775422" y="2335379"/>
-            <a:ext cx="7593155" cy="3778612"/>
+            <a:off x="775422" y="2439042"/>
+            <a:ext cx="7593155" cy="3571286"/>
           </a:xfrm>
           <a:prstGeom prst="roundRect">
             <a:avLst>
@@ -5787,13 +5787,13 @@
   <p:clrMapOvr>
     <a:masterClrMapping/>
   </p:clrMapOvr>
-  <mc:AlternateContent xmlns:mc="http://schemas.openxmlformats.org/markup-compatibility/2006">
-    <mc:Choice xmlns:p14="http://schemas.microsoft.com/office/powerpoint/2010/main" Requires="p14">
+  <mc:AlternateContent xmlns:mc="http://schemas.openxmlformats.org/markup-compatibility/2006" xmlns:p14="http://schemas.microsoft.com/office/powerpoint/2010/main">
+    <mc:Choice Requires="p14">
       <p:transition spd="med" p14:dur="700">
         <p:fade/>
       </p:transition>
     </mc:Choice>
-    <mc:Fallback>
+    <mc:Fallback xmlns="">
       <p:transition spd="med">
         <p:fade/>
       </p:transition>
@@ -5919,13 +5919,13 @@
   <p:clrMapOvr>
     <a:masterClrMapping/>
   </p:clrMapOvr>
-  <mc:AlternateContent xmlns:mc="http://schemas.openxmlformats.org/markup-compatibility/2006">
-    <mc:Choice xmlns:p14="http://schemas.microsoft.com/office/powerpoint/2010/main" Requires="p14">
+  <mc:AlternateContent xmlns:mc="http://schemas.openxmlformats.org/markup-compatibility/2006" xmlns:p14="http://schemas.microsoft.com/office/powerpoint/2010/main">
+    <mc:Choice Requires="p14">
       <p:transition spd="med" p14:dur="700">
         <p:fade/>
       </p:transition>
     </mc:Choice>
-    <mc:Fallback>
+    <mc:Fallback xmlns="">
       <p:transition spd="med">
         <p:fade/>
       </p:transition>
@@ -5966,7 +5966,7 @@
         </p:nvSpPr>
         <p:spPr>
           <a:xfrm>
-            <a:off x="1131794" y="2666137"/>
+            <a:off x="1099297" y="2343407"/>
             <a:ext cx="6945406" cy="1754326"/>
           </a:xfrm>
           <a:prstGeom prst="rect">
@@ -6003,13 +6003,13 @@
   <p:clrMapOvr>
     <a:masterClrMapping/>
   </p:clrMapOvr>
-  <mc:AlternateContent xmlns:mc="http://schemas.openxmlformats.org/markup-compatibility/2006">
-    <mc:Choice xmlns:p15="http://schemas.microsoft.com/office/powerpoint/2012/main" Requires="p15">
+  <mc:AlternateContent xmlns:mc="http://schemas.openxmlformats.org/markup-compatibility/2006" xmlns:p15="http://schemas.microsoft.com/office/powerpoint/2012/main">
+    <mc:Choice Requires="p15">
       <p:transition xmlns:p14="http://schemas.microsoft.com/office/powerpoint/2010/main" spd="slow" p14:dur="2000">
         <p15:prstTrans prst="crush"/>
       </p:transition>
     </mc:Choice>
-    <mc:Fallback>
+    <mc:Fallback xmlns="">
       <p:transition spd="slow">
         <p:fade/>
       </p:transition>
@@ -6598,7 +6598,6 @@
                         <a:rPr lang="en-US" sz="2400" dirty="0" smtClean="0"/>
                         <a:t> Support</a:t>
                       </a:r>
-                      <a:endParaRPr lang="en-US" sz="2400" dirty="0" smtClean="0"/>
                     </a:p>
                   </a:txBody>
                   <a:tcPr>
@@ -6679,7 +6678,6 @@
                         <a:rPr lang="en-US" sz="2400" i="0" dirty="0" smtClean="0"/>
                         <a:t>:</a:t>
                       </a:r>
-                      <a:endParaRPr lang="en-US" sz="2400" i="0" dirty="0" smtClean="0"/>
                     </a:p>
                   </a:txBody>
                   <a:tcPr>
@@ -6888,13 +6886,13 @@
   <p:clrMapOvr>
     <a:masterClrMapping/>
   </p:clrMapOvr>
-  <mc:AlternateContent xmlns:mc="http://schemas.openxmlformats.org/markup-compatibility/2006">
-    <mc:Choice xmlns:p14="http://schemas.microsoft.com/office/powerpoint/2010/main" Requires="p14">
+  <mc:AlternateContent xmlns:mc="http://schemas.openxmlformats.org/markup-compatibility/2006" xmlns:p14="http://schemas.microsoft.com/office/powerpoint/2010/main">
+    <mc:Choice Requires="p14">
       <p:transition spd="med" p14:dur="700">
         <p:fade/>
       </p:transition>
     </mc:Choice>
-    <mc:Fallback>
+    <mc:Fallback xmlns="">
       <p:transition spd="med">
         <p:fade/>
       </p:transition>
@@ -7029,13 +7027,13 @@
   <p:clrMapOvr>
     <a:masterClrMapping/>
   </p:clrMapOvr>
-  <mc:AlternateContent xmlns:mc="http://schemas.openxmlformats.org/markup-compatibility/2006">
-    <mc:Choice xmlns:p14="http://schemas.microsoft.com/office/powerpoint/2010/main" Requires="p14">
+  <mc:AlternateContent xmlns:mc="http://schemas.openxmlformats.org/markup-compatibility/2006" xmlns:p14="http://schemas.microsoft.com/office/powerpoint/2010/main">
+    <mc:Choice Requires="p14">
       <p:transition spd="med" p14:dur="700">
         <p:fade/>
       </p:transition>
     </mc:Choice>
-    <mc:Fallback>
+    <mc:Fallback xmlns="">
       <p:transition spd="med">
         <p:fade/>
       </p:transition>
@@ -7219,13 +7217,13 @@
   <p:clrMapOvr>
     <a:masterClrMapping/>
   </p:clrMapOvr>
-  <mc:AlternateContent xmlns:mc="http://schemas.openxmlformats.org/markup-compatibility/2006">
-    <mc:Choice xmlns:p14="http://schemas.microsoft.com/office/powerpoint/2010/main" Requires="p14">
+  <mc:AlternateContent xmlns:mc="http://schemas.openxmlformats.org/markup-compatibility/2006" xmlns:p14="http://schemas.microsoft.com/office/powerpoint/2010/main">
+    <mc:Choice Requires="p14">
       <p:transition spd="med" p14:dur="700">
         <p:fade/>
       </p:transition>
     </mc:Choice>
-    <mc:Fallback>
+    <mc:Fallback xmlns="">
       <p:transition spd="med">
         <p:fade/>
       </p:transition>
@@ -7383,13 +7381,13 @@
   <p:clrMapOvr>
     <a:masterClrMapping/>
   </p:clrMapOvr>
-  <mc:AlternateContent xmlns:mc="http://schemas.openxmlformats.org/markup-compatibility/2006">
-    <mc:Choice xmlns:p14="http://schemas.microsoft.com/office/powerpoint/2010/main" Requires="p14">
+  <mc:AlternateContent xmlns:mc="http://schemas.openxmlformats.org/markup-compatibility/2006" xmlns:p14="http://schemas.microsoft.com/office/powerpoint/2010/main">
+    <mc:Choice Requires="p14">
       <p:transition spd="med" p14:dur="700">
         <p:fade/>
       </p:transition>
     </mc:Choice>
-    <mc:Fallback>
+    <mc:Fallback xmlns="">
       <p:transition spd="med">
         <p:fade/>
       </p:transition>
@@ -7542,13 +7540,13 @@
   <p:clrMapOvr>
     <a:masterClrMapping/>
   </p:clrMapOvr>
-  <mc:AlternateContent xmlns:mc="http://schemas.openxmlformats.org/markup-compatibility/2006">
-    <mc:Choice xmlns:p14="http://schemas.microsoft.com/office/powerpoint/2010/main" Requires="p14">
+  <mc:AlternateContent xmlns:mc="http://schemas.openxmlformats.org/markup-compatibility/2006" xmlns:p14="http://schemas.microsoft.com/office/powerpoint/2010/main">
+    <mc:Choice Requires="p14">
       <p:transition spd="med" p14:dur="700">
         <p:fade/>
       </p:transition>
     </mc:Choice>
-    <mc:Fallback>
+    <mc:Fallback xmlns="">
       <p:transition spd="med">
         <p:fade/>
       </p:transition>
@@ -7696,13 +7694,13 @@
   <p:clrMapOvr>
     <a:masterClrMapping/>
   </p:clrMapOvr>
-  <mc:AlternateContent xmlns:mc="http://schemas.openxmlformats.org/markup-compatibility/2006">
-    <mc:Choice xmlns:p14="http://schemas.microsoft.com/office/powerpoint/2010/main" Requires="p14">
+  <mc:AlternateContent xmlns:mc="http://schemas.openxmlformats.org/markup-compatibility/2006" xmlns:p14="http://schemas.microsoft.com/office/powerpoint/2010/main">
+    <mc:Choice Requires="p14">
       <p:transition spd="med" p14:dur="700">
         <p:fade/>
       </p:transition>
     </mc:Choice>
-    <mc:Fallback>
+    <mc:Fallback xmlns="">
       <p:transition spd="med">
         <p:fade/>
       </p:transition>
@@ -7849,13 +7847,13 @@
   <p:clrMapOvr>
     <a:masterClrMapping/>
   </p:clrMapOvr>
-  <mc:AlternateContent xmlns:mc="http://schemas.openxmlformats.org/markup-compatibility/2006">
-    <mc:Choice xmlns:p14="http://schemas.microsoft.com/office/powerpoint/2010/main" Requires="p14">
+  <mc:AlternateContent xmlns:mc="http://schemas.openxmlformats.org/markup-compatibility/2006" xmlns:p14="http://schemas.microsoft.com/office/powerpoint/2010/main">
+    <mc:Choice Requires="p14">
       <p:transition spd="med" p14:dur="700">
         <p:fade/>
       </p:transition>
     </mc:Choice>
-    <mc:Fallback>
+    <mc:Fallback xmlns="">
       <p:transition spd="med">
         <p:fade/>
       </p:transition>
@@ -7950,8 +7948,8 @@
         </p:blipFill>
         <p:spPr>
           <a:xfrm>
-            <a:off x="712694" y="2318929"/>
-            <a:ext cx="7718612" cy="3811513"/>
+            <a:off x="712694" y="2415194"/>
+            <a:ext cx="7718612" cy="3618982"/>
           </a:xfrm>
           <a:prstGeom prst="roundRect">
             <a:avLst>
@@ -7994,13 +7992,13 @@
   <p:clrMapOvr>
     <a:masterClrMapping/>
   </p:clrMapOvr>
-  <mc:AlternateContent xmlns:mc="http://schemas.openxmlformats.org/markup-compatibility/2006">
-    <mc:Choice xmlns:p14="http://schemas.microsoft.com/office/powerpoint/2010/main" Requires="p14">
+  <mc:AlternateContent xmlns:mc="http://schemas.openxmlformats.org/markup-compatibility/2006" xmlns:p14="http://schemas.microsoft.com/office/powerpoint/2010/main">
+    <mc:Choice Requires="p14">
       <p:transition spd="med" p14:dur="700">
         <p:fade/>
       </p:transition>
     </mc:Choice>
-    <mc:Fallback>
+    <mc:Fallback xmlns="">
       <p:transition spd="med">
         <p:fade/>
       </p:transition>

</xml_diff>